<commit_message>
[reg_tile] add missing figures
</commit_message>
<xml_diff>
--- a/blogs/reg_tile/figures.pptx
+++ b/blogs/reg_tile/figures.pptx
@@ -14,6 +14,8 @@
     <p:sldId id="262" r:id="rId8"/>
     <p:sldId id="263" r:id="rId9"/>
     <p:sldId id="264" r:id="rId10"/>
+    <p:sldId id="265" r:id="rId11"/>
+    <p:sldId id="266" r:id="rId12"/>
   </p:sldIdLst>
   <p:sldSz cx="12192000" cy="6858000"/>
   <p:notesSz cx="6858000" cy="9144000"/>
@@ -269,7 +271,7 @@
           <a:p>
             <a:fld id="{89170DA2-E98C-46C7-8CBA-4D919B2F7647}" type="datetimeFigureOut">
               <a:rPr lang="en-US" smtClean="0"/>
-              <a:t>3/31/2025</a:t>
+              <a:t>6/20/2025</a:t>
             </a:fld>
             <a:endParaRPr lang="en-US"/>
           </a:p>
@@ -469,7 +471,7 @@
           <a:p>
             <a:fld id="{89170DA2-E98C-46C7-8CBA-4D919B2F7647}" type="datetimeFigureOut">
               <a:rPr lang="en-US" smtClean="0"/>
-              <a:t>3/31/2025</a:t>
+              <a:t>6/20/2025</a:t>
             </a:fld>
             <a:endParaRPr lang="en-US"/>
           </a:p>
@@ -679,7 +681,7 @@
           <a:p>
             <a:fld id="{89170DA2-E98C-46C7-8CBA-4D919B2F7647}" type="datetimeFigureOut">
               <a:rPr lang="en-US" smtClean="0"/>
-              <a:t>3/31/2025</a:t>
+              <a:t>6/20/2025</a:t>
             </a:fld>
             <a:endParaRPr lang="en-US"/>
           </a:p>
@@ -879,7 +881,7 @@
           <a:p>
             <a:fld id="{89170DA2-E98C-46C7-8CBA-4D919B2F7647}" type="datetimeFigureOut">
               <a:rPr lang="en-US" smtClean="0"/>
-              <a:t>3/31/2025</a:t>
+              <a:t>6/20/2025</a:t>
             </a:fld>
             <a:endParaRPr lang="en-US"/>
           </a:p>
@@ -1155,7 +1157,7 @@
           <a:p>
             <a:fld id="{89170DA2-E98C-46C7-8CBA-4D919B2F7647}" type="datetimeFigureOut">
               <a:rPr lang="en-US" smtClean="0"/>
-              <a:t>3/31/2025</a:t>
+              <a:t>6/20/2025</a:t>
             </a:fld>
             <a:endParaRPr lang="en-US"/>
           </a:p>
@@ -1423,7 +1425,7 @@
           <a:p>
             <a:fld id="{89170DA2-E98C-46C7-8CBA-4D919B2F7647}" type="datetimeFigureOut">
               <a:rPr lang="en-US" smtClean="0"/>
-              <a:t>3/31/2025</a:t>
+              <a:t>6/20/2025</a:t>
             </a:fld>
             <a:endParaRPr lang="en-US"/>
           </a:p>
@@ -1838,7 +1840,7 @@
           <a:p>
             <a:fld id="{89170DA2-E98C-46C7-8CBA-4D919B2F7647}" type="datetimeFigureOut">
               <a:rPr lang="en-US" smtClean="0"/>
-              <a:t>3/31/2025</a:t>
+              <a:t>6/20/2025</a:t>
             </a:fld>
             <a:endParaRPr lang="en-US"/>
           </a:p>
@@ -1980,7 +1982,7 @@
           <a:p>
             <a:fld id="{89170DA2-E98C-46C7-8CBA-4D919B2F7647}" type="datetimeFigureOut">
               <a:rPr lang="en-US" smtClean="0"/>
-              <a:t>3/31/2025</a:t>
+              <a:t>6/20/2025</a:t>
             </a:fld>
             <a:endParaRPr lang="en-US"/>
           </a:p>
@@ -2093,7 +2095,7 @@
           <a:p>
             <a:fld id="{89170DA2-E98C-46C7-8CBA-4D919B2F7647}" type="datetimeFigureOut">
               <a:rPr lang="en-US" smtClean="0"/>
-              <a:t>3/31/2025</a:t>
+              <a:t>6/20/2025</a:t>
             </a:fld>
             <a:endParaRPr lang="en-US"/>
           </a:p>
@@ -2406,7 +2408,7 @@
           <a:p>
             <a:fld id="{89170DA2-E98C-46C7-8CBA-4D919B2F7647}" type="datetimeFigureOut">
               <a:rPr lang="en-US" smtClean="0"/>
-              <a:t>3/31/2025</a:t>
+              <a:t>6/20/2025</a:t>
             </a:fld>
             <a:endParaRPr lang="en-US"/>
           </a:p>
@@ -2695,7 +2697,7 @@
           <a:p>
             <a:fld id="{89170DA2-E98C-46C7-8CBA-4D919B2F7647}" type="datetimeFigureOut">
               <a:rPr lang="en-US" smtClean="0"/>
-              <a:t>3/31/2025</a:t>
+              <a:t>6/20/2025</a:t>
             </a:fld>
             <a:endParaRPr lang="en-US"/>
           </a:p>
@@ -2938,7 +2940,7 @@
           <a:p>
             <a:fld id="{89170DA2-E98C-46C7-8CBA-4D919B2F7647}" type="datetimeFigureOut">
               <a:rPr lang="en-US" smtClean="0"/>
-              <a:t>3/31/2025</a:t>
+              <a:t>6/20/2025</a:t>
             </a:fld>
             <a:endParaRPr lang="en-US"/>
           </a:p>
@@ -3368,6 +3370,1475 @@
 </p:sld>
 </file>
 
+<file path=ppt/slides/slide10.xml><?xml version="1.0" encoding="utf-8"?>
+<p:sld xmlns:a="http://schemas.openxmlformats.org/drawingml/2006/main" xmlns:r="http://schemas.openxmlformats.org/officeDocument/2006/relationships" xmlns:p="http://schemas.openxmlformats.org/presentationml/2006/main">
+  <p:cSld>
+    <p:spTree>
+      <p:nvGrpSpPr>
+        <p:cNvPr id="1" name=""/>
+        <p:cNvGrpSpPr/>
+        <p:nvPr/>
+      </p:nvGrpSpPr>
+      <p:grpSpPr>
+        <a:xfrm>
+          <a:off x="0" y="0"/>
+          <a:ext cx="0" cy="0"/>
+          <a:chOff x="0" y="0"/>
+          <a:chExt cx="0" cy="0"/>
+        </a:xfrm>
+      </p:grpSpPr>
+      <p:sp>
+        <p:nvSpPr>
+          <p:cNvPr id="2" name="矩形 1">
+            <a:extLst>
+              <a:ext uri="{FF2B5EF4-FFF2-40B4-BE49-F238E27FC236}">
+                <a16:creationId xmlns:a16="http://schemas.microsoft.com/office/drawing/2014/main" id="{304A7555-DD88-A75B-22D1-B0FC939BB48E}"/>
+              </a:ext>
+            </a:extLst>
+          </p:cNvPr>
+          <p:cNvSpPr/>
+          <p:nvPr/>
+        </p:nvSpPr>
+        <p:spPr>
+          <a:xfrm>
+            <a:off x="1175952" y="1256308"/>
+            <a:ext cx="1502797" cy="580446"/>
+          </a:xfrm>
+          <a:prstGeom prst="rect">
+            <a:avLst/>
+          </a:prstGeom>
+        </p:spPr>
+        <p:style>
+          <a:lnRef idx="2">
+            <a:schemeClr val="accent6">
+              <a:shade val="15000"/>
+            </a:schemeClr>
+          </a:lnRef>
+          <a:fillRef idx="1">
+            <a:schemeClr val="accent6"/>
+          </a:fillRef>
+          <a:effectRef idx="0">
+            <a:schemeClr val="accent6"/>
+          </a:effectRef>
+          <a:fontRef idx="minor">
+            <a:schemeClr val="lt1"/>
+          </a:fontRef>
+        </p:style>
+        <p:txBody>
+          <a:bodyPr rtlCol="0" anchor="ctr"/>
+          <a:lstStyle/>
+          <a:p>
+            <a:pPr algn="ctr"/>
+            <a:r>
+              <a:rPr lang="en-US" dirty="0"/>
+              <a:t>SM CUDA Core</a:t>
+            </a:r>
+          </a:p>
+        </p:txBody>
+      </p:sp>
+      <p:sp>
+        <p:nvSpPr>
+          <p:cNvPr id="3" name="矩形 2">
+            <a:extLst>
+              <a:ext uri="{FF2B5EF4-FFF2-40B4-BE49-F238E27FC236}">
+                <a16:creationId xmlns:a16="http://schemas.microsoft.com/office/drawing/2014/main" id="{C0E1B3C3-A664-7954-3377-3ACA8B6930D8}"/>
+              </a:ext>
+            </a:extLst>
+          </p:cNvPr>
+          <p:cNvSpPr/>
+          <p:nvPr/>
+        </p:nvSpPr>
+        <p:spPr>
+          <a:xfrm>
+            <a:off x="917534" y="2259927"/>
+            <a:ext cx="2019632" cy="580445"/>
+          </a:xfrm>
+          <a:prstGeom prst="rect">
+            <a:avLst/>
+          </a:prstGeom>
+          <a:solidFill>
+            <a:schemeClr val="bg2"/>
+          </a:solidFill>
+        </p:spPr>
+        <p:style>
+          <a:lnRef idx="2">
+            <a:schemeClr val="accent6">
+              <a:shade val="15000"/>
+            </a:schemeClr>
+          </a:lnRef>
+          <a:fillRef idx="1">
+            <a:schemeClr val="accent6"/>
+          </a:fillRef>
+          <a:effectRef idx="0">
+            <a:schemeClr val="accent6"/>
+          </a:effectRef>
+          <a:fontRef idx="minor">
+            <a:schemeClr val="lt1"/>
+          </a:fontRef>
+        </p:style>
+        <p:txBody>
+          <a:bodyPr rtlCol="0" anchor="ctr"/>
+          <a:lstStyle/>
+          <a:p>
+            <a:pPr algn="ctr"/>
+            <a:r>
+              <a:rPr lang="en-US" dirty="0">
+                <a:solidFill>
+                  <a:schemeClr val="tx1"/>
+                </a:solidFill>
+              </a:rPr>
+              <a:t>RF</a:t>
+            </a:r>
+          </a:p>
+          <a:p>
+            <a:pPr algn="ctr"/>
+            <a:r>
+              <a:rPr lang="en-US" dirty="0">
+                <a:solidFill>
+                  <a:schemeClr val="tx1"/>
+                </a:solidFill>
+              </a:rPr>
+              <a:t>256KB</a:t>
+            </a:r>
+          </a:p>
+        </p:txBody>
+      </p:sp>
+      <p:sp>
+        <p:nvSpPr>
+          <p:cNvPr id="4" name="矩形 3">
+            <a:extLst>
+              <a:ext uri="{FF2B5EF4-FFF2-40B4-BE49-F238E27FC236}">
+                <a16:creationId xmlns:a16="http://schemas.microsoft.com/office/drawing/2014/main" id="{3FE640EB-A190-A944-50DE-29D64B157129}"/>
+              </a:ext>
+            </a:extLst>
+          </p:cNvPr>
+          <p:cNvSpPr/>
+          <p:nvPr/>
+        </p:nvSpPr>
+        <p:spPr>
+          <a:xfrm>
+            <a:off x="917534" y="3266240"/>
+            <a:ext cx="2019632" cy="580446"/>
+          </a:xfrm>
+          <a:prstGeom prst="rect">
+            <a:avLst/>
+          </a:prstGeom>
+          <a:solidFill>
+            <a:schemeClr val="bg2"/>
+          </a:solidFill>
+        </p:spPr>
+        <p:style>
+          <a:lnRef idx="2">
+            <a:schemeClr val="accent6">
+              <a:shade val="15000"/>
+            </a:schemeClr>
+          </a:lnRef>
+          <a:fillRef idx="1">
+            <a:schemeClr val="accent6"/>
+          </a:fillRef>
+          <a:effectRef idx="0">
+            <a:schemeClr val="accent6"/>
+          </a:effectRef>
+          <a:fontRef idx="minor">
+            <a:schemeClr val="lt1"/>
+          </a:fontRef>
+        </p:style>
+        <p:txBody>
+          <a:bodyPr rtlCol="0" anchor="ctr"/>
+          <a:lstStyle/>
+          <a:p>
+            <a:pPr algn="ctr"/>
+            <a:r>
+              <a:rPr lang="en-US" dirty="0">
+                <a:solidFill>
+                  <a:schemeClr val="tx1"/>
+                </a:solidFill>
+              </a:rPr>
+              <a:t>DRAM</a:t>
+            </a:r>
+          </a:p>
+          <a:p>
+            <a:pPr algn="ctr"/>
+            <a:r>
+              <a:rPr lang="en-US" dirty="0">
+                <a:solidFill>
+                  <a:schemeClr val="tx1"/>
+                </a:solidFill>
+              </a:rPr>
+              <a:t>inf KB</a:t>
+            </a:r>
+          </a:p>
+        </p:txBody>
+      </p:sp>
+      <p:cxnSp>
+        <p:nvCxnSpPr>
+          <p:cNvPr id="5" name="直接箭头连接符 4">
+            <a:extLst>
+              <a:ext uri="{FF2B5EF4-FFF2-40B4-BE49-F238E27FC236}">
+                <a16:creationId xmlns:a16="http://schemas.microsoft.com/office/drawing/2014/main" id="{F02ED1B7-C3CC-DB83-B773-934A9D8D9C91}"/>
+              </a:ext>
+            </a:extLst>
+          </p:cNvPr>
+          <p:cNvCxnSpPr>
+            <a:cxnSpLocks/>
+            <a:stCxn id="3" idx="0"/>
+            <a:endCxn id="2" idx="2"/>
+          </p:cNvCxnSpPr>
+          <p:nvPr/>
+        </p:nvCxnSpPr>
+        <p:spPr>
+          <a:xfrm flipV="1">
+            <a:off x="1927350" y="1836754"/>
+            <a:ext cx="1" cy="423173"/>
+          </a:xfrm>
+          <a:prstGeom prst="straightConnector1">
+            <a:avLst/>
+          </a:prstGeom>
+          <a:ln w="57150">
+            <a:tailEnd type="triangle"/>
+          </a:ln>
+        </p:spPr>
+        <p:style>
+          <a:lnRef idx="2">
+            <a:schemeClr val="dk1"/>
+          </a:lnRef>
+          <a:fillRef idx="0">
+            <a:schemeClr val="dk1"/>
+          </a:fillRef>
+          <a:effectRef idx="1">
+            <a:schemeClr val="dk1"/>
+          </a:effectRef>
+          <a:fontRef idx="minor">
+            <a:schemeClr val="tx1"/>
+          </a:fontRef>
+        </p:style>
+      </p:cxnSp>
+      <p:cxnSp>
+        <p:nvCxnSpPr>
+          <p:cNvPr id="6" name="直接箭头连接符 5">
+            <a:extLst>
+              <a:ext uri="{FF2B5EF4-FFF2-40B4-BE49-F238E27FC236}">
+                <a16:creationId xmlns:a16="http://schemas.microsoft.com/office/drawing/2014/main" id="{8D95DCCF-46DB-6F3E-CCE7-A69AC58A7124}"/>
+              </a:ext>
+            </a:extLst>
+          </p:cNvPr>
+          <p:cNvCxnSpPr>
+            <a:cxnSpLocks/>
+            <a:stCxn id="4" idx="0"/>
+          </p:cNvCxnSpPr>
+          <p:nvPr/>
+        </p:nvCxnSpPr>
+        <p:spPr>
+          <a:xfrm flipV="1">
+            <a:off x="1927350" y="2843067"/>
+            <a:ext cx="0" cy="423173"/>
+          </a:xfrm>
+          <a:prstGeom prst="straightConnector1">
+            <a:avLst/>
+          </a:prstGeom>
+          <a:ln w="28575">
+            <a:tailEnd type="triangle"/>
+          </a:ln>
+        </p:spPr>
+        <p:style>
+          <a:lnRef idx="2">
+            <a:schemeClr val="dk1"/>
+          </a:lnRef>
+          <a:fillRef idx="0">
+            <a:schemeClr val="dk1"/>
+          </a:fillRef>
+          <a:effectRef idx="1">
+            <a:schemeClr val="dk1"/>
+          </a:effectRef>
+          <a:fontRef idx="minor">
+            <a:schemeClr val="tx1"/>
+          </a:fontRef>
+        </p:style>
+      </p:cxnSp>
+      <p:sp>
+        <p:nvSpPr>
+          <p:cNvPr id="7" name="文本框 6">
+            <a:extLst>
+              <a:ext uri="{FF2B5EF4-FFF2-40B4-BE49-F238E27FC236}">
+                <a16:creationId xmlns:a16="http://schemas.microsoft.com/office/drawing/2014/main" id="{B6929412-87F2-02D4-2956-CA3B462FC0CA}"/>
+              </a:ext>
+            </a:extLst>
+          </p:cNvPr>
+          <p:cNvSpPr txBox="1"/>
+          <p:nvPr/>
+        </p:nvSpPr>
+        <p:spPr>
+          <a:xfrm>
+            <a:off x="1053137" y="3897833"/>
+            <a:ext cx="1772280" cy="646331"/>
+          </a:xfrm>
+          <a:prstGeom prst="rect">
+            <a:avLst/>
+          </a:prstGeom>
+          <a:noFill/>
+        </p:spPr>
+        <p:txBody>
+          <a:bodyPr wrap="none" rtlCol="0">
+            <a:spAutoFit/>
+          </a:bodyPr>
+          <a:lstStyle/>
+          <a:p>
+            <a:pPr algn="ctr"/>
+            <a:r>
+              <a:rPr lang="en-US" dirty="0"/>
+              <a:t>Per SM</a:t>
+            </a:r>
+          </a:p>
+          <a:p>
+            <a:pPr algn="ctr"/>
+            <a:r>
+              <a:rPr lang="en-US" dirty="0"/>
+              <a:t>A100 80GB SXM</a:t>
+            </a:r>
+          </a:p>
+        </p:txBody>
+      </p:sp>
+      <p:sp>
+        <p:nvSpPr>
+          <p:cNvPr id="8" name="文本框 7">
+            <a:extLst>
+              <a:ext uri="{FF2B5EF4-FFF2-40B4-BE49-F238E27FC236}">
+                <a16:creationId xmlns:a16="http://schemas.microsoft.com/office/drawing/2014/main" id="{6CE55732-A7DE-E4A7-2A16-7E83CF6BBDB6}"/>
+              </a:ext>
+            </a:extLst>
+          </p:cNvPr>
+          <p:cNvSpPr txBox="1"/>
+          <p:nvPr/>
+        </p:nvSpPr>
+        <p:spPr>
+          <a:xfrm>
+            <a:off x="1939277" y="1863674"/>
+            <a:ext cx="1331775" cy="369332"/>
+          </a:xfrm>
+          <a:prstGeom prst="rect">
+            <a:avLst/>
+          </a:prstGeom>
+          <a:noFill/>
+        </p:spPr>
+        <p:txBody>
+          <a:bodyPr wrap="none" rtlCol="0">
+            <a:spAutoFit/>
+          </a:bodyPr>
+          <a:lstStyle/>
+          <a:p>
+            <a:r>
+              <a:rPr lang="en-US" dirty="0"/>
+              <a:t>512 B/cycle</a:t>
+            </a:r>
+          </a:p>
+        </p:txBody>
+      </p:sp>
+      <p:sp>
+        <p:nvSpPr>
+          <p:cNvPr id="9" name="文本框 8">
+            <a:extLst>
+              <a:ext uri="{FF2B5EF4-FFF2-40B4-BE49-F238E27FC236}">
+                <a16:creationId xmlns:a16="http://schemas.microsoft.com/office/drawing/2014/main" id="{2ED45E0B-590A-3182-395A-2E1B570B5C3F}"/>
+              </a:ext>
+            </a:extLst>
+          </p:cNvPr>
+          <p:cNvSpPr txBox="1"/>
+          <p:nvPr/>
+        </p:nvSpPr>
+        <p:spPr>
+          <a:xfrm>
+            <a:off x="1927350" y="2867293"/>
+            <a:ext cx="1397498" cy="369332"/>
+          </a:xfrm>
+          <a:prstGeom prst="rect">
+            <a:avLst/>
+          </a:prstGeom>
+          <a:noFill/>
+        </p:spPr>
+        <p:txBody>
+          <a:bodyPr wrap="none" rtlCol="0">
+            <a:spAutoFit/>
+          </a:bodyPr>
+          <a:lstStyle/>
+          <a:p>
+            <a:r>
+              <a:rPr lang="en-US" dirty="0"/>
+              <a:t>13.3 B/cycle</a:t>
+            </a:r>
+          </a:p>
+        </p:txBody>
+      </p:sp>
+      <p:sp>
+        <p:nvSpPr>
+          <p:cNvPr id="10" name="文本框 9">
+            <a:extLst>
+              <a:ext uri="{FF2B5EF4-FFF2-40B4-BE49-F238E27FC236}">
+                <a16:creationId xmlns:a16="http://schemas.microsoft.com/office/drawing/2014/main" id="{19FE0725-FD4C-C1B7-61AF-826BC1D1531D}"/>
+              </a:ext>
+            </a:extLst>
+          </p:cNvPr>
+          <p:cNvSpPr txBox="1"/>
+          <p:nvPr/>
+        </p:nvSpPr>
+        <p:spPr>
+          <a:xfrm>
+            <a:off x="2770189" y="1361865"/>
+            <a:ext cx="1509709" cy="369332"/>
+          </a:xfrm>
+          <a:prstGeom prst="rect">
+            <a:avLst/>
+          </a:prstGeom>
+          <a:noFill/>
+        </p:spPr>
+        <p:txBody>
+          <a:bodyPr wrap="none" rtlCol="0">
+            <a:spAutoFit/>
+          </a:bodyPr>
+          <a:lstStyle/>
+          <a:p>
+            <a:r>
+              <a:rPr lang="en-US" dirty="0"/>
+              <a:t>64 FMA/cycle</a:t>
+            </a:r>
+          </a:p>
+        </p:txBody>
+      </p:sp>
+    </p:spTree>
+    <p:extLst>
+      <p:ext uri="{BB962C8B-B14F-4D97-AF65-F5344CB8AC3E}">
+        <p14:creationId xmlns:p14="http://schemas.microsoft.com/office/powerpoint/2010/main" val="1640759712"/>
+      </p:ext>
+    </p:extLst>
+  </p:cSld>
+  <p:clrMapOvr>
+    <a:masterClrMapping/>
+  </p:clrMapOvr>
+</p:sld>
+</file>
+
+<file path=ppt/slides/slide11.xml><?xml version="1.0" encoding="utf-8"?>
+<p:sld xmlns:a="http://schemas.openxmlformats.org/drawingml/2006/main" xmlns:r="http://schemas.openxmlformats.org/officeDocument/2006/relationships" xmlns:p="http://schemas.openxmlformats.org/presentationml/2006/main">
+  <p:cSld>
+    <p:spTree>
+      <p:nvGrpSpPr>
+        <p:cNvPr id="1" name="">
+          <a:extLst>
+            <a:ext uri="{FF2B5EF4-FFF2-40B4-BE49-F238E27FC236}">
+              <a16:creationId xmlns:a16="http://schemas.microsoft.com/office/drawing/2014/main" id="{4F8CB990-EBA6-AB3F-A379-D6C1EF1AA607}"/>
+            </a:ext>
+          </a:extLst>
+        </p:cNvPr>
+        <p:cNvGrpSpPr/>
+        <p:nvPr/>
+      </p:nvGrpSpPr>
+      <p:grpSpPr>
+        <a:xfrm>
+          <a:off x="0" y="0"/>
+          <a:ext cx="0" cy="0"/>
+          <a:chOff x="0" y="0"/>
+          <a:chExt cx="0" cy="0"/>
+        </a:xfrm>
+      </p:grpSpPr>
+      <p:sp>
+        <p:nvSpPr>
+          <p:cNvPr id="2" name="矩形 1">
+            <a:extLst>
+              <a:ext uri="{FF2B5EF4-FFF2-40B4-BE49-F238E27FC236}">
+                <a16:creationId xmlns:a16="http://schemas.microsoft.com/office/drawing/2014/main" id="{1A053846-0789-7DFA-F36A-30A727CC10A7}"/>
+              </a:ext>
+            </a:extLst>
+          </p:cNvPr>
+          <p:cNvSpPr/>
+          <p:nvPr/>
+        </p:nvSpPr>
+        <p:spPr>
+          <a:xfrm>
+            <a:off x="1175952" y="1256308"/>
+            <a:ext cx="1502797" cy="580446"/>
+          </a:xfrm>
+          <a:prstGeom prst="rect">
+            <a:avLst/>
+          </a:prstGeom>
+        </p:spPr>
+        <p:style>
+          <a:lnRef idx="2">
+            <a:schemeClr val="accent6">
+              <a:shade val="15000"/>
+            </a:schemeClr>
+          </a:lnRef>
+          <a:fillRef idx="1">
+            <a:schemeClr val="accent6"/>
+          </a:fillRef>
+          <a:effectRef idx="0">
+            <a:schemeClr val="accent6"/>
+          </a:effectRef>
+          <a:fontRef idx="minor">
+            <a:schemeClr val="lt1"/>
+          </a:fontRef>
+        </p:style>
+        <p:txBody>
+          <a:bodyPr rtlCol="0" anchor="ctr"/>
+          <a:lstStyle/>
+          <a:p>
+            <a:pPr algn="ctr"/>
+            <a:r>
+              <a:rPr lang="en-US" dirty="0"/>
+              <a:t>SM CUDA Core</a:t>
+            </a:r>
+          </a:p>
+        </p:txBody>
+      </p:sp>
+      <p:sp>
+        <p:nvSpPr>
+          <p:cNvPr id="3" name="矩形 2">
+            <a:extLst>
+              <a:ext uri="{FF2B5EF4-FFF2-40B4-BE49-F238E27FC236}">
+                <a16:creationId xmlns:a16="http://schemas.microsoft.com/office/drawing/2014/main" id="{67F4E6EA-B1C8-F068-9CBC-106C5A2A639B}"/>
+              </a:ext>
+            </a:extLst>
+          </p:cNvPr>
+          <p:cNvSpPr/>
+          <p:nvPr/>
+        </p:nvSpPr>
+        <p:spPr>
+          <a:xfrm>
+            <a:off x="917534" y="2259927"/>
+            <a:ext cx="2019632" cy="580445"/>
+          </a:xfrm>
+          <a:prstGeom prst="rect">
+            <a:avLst/>
+          </a:prstGeom>
+          <a:solidFill>
+            <a:schemeClr val="bg2"/>
+          </a:solidFill>
+        </p:spPr>
+        <p:style>
+          <a:lnRef idx="2">
+            <a:schemeClr val="accent6">
+              <a:shade val="15000"/>
+            </a:schemeClr>
+          </a:lnRef>
+          <a:fillRef idx="1">
+            <a:schemeClr val="accent6"/>
+          </a:fillRef>
+          <a:effectRef idx="0">
+            <a:schemeClr val="accent6"/>
+          </a:effectRef>
+          <a:fontRef idx="minor">
+            <a:schemeClr val="lt1"/>
+          </a:fontRef>
+        </p:style>
+        <p:txBody>
+          <a:bodyPr rtlCol="0" anchor="ctr"/>
+          <a:lstStyle/>
+          <a:p>
+            <a:pPr algn="ctr"/>
+            <a:r>
+              <a:rPr lang="en-US" dirty="0">
+                <a:solidFill>
+                  <a:schemeClr val="tx1"/>
+                </a:solidFill>
+              </a:rPr>
+              <a:t>RF</a:t>
+            </a:r>
+          </a:p>
+          <a:p>
+            <a:pPr algn="ctr"/>
+            <a:r>
+              <a:rPr lang="en-US" dirty="0">
+                <a:solidFill>
+                  <a:schemeClr val="tx1"/>
+                </a:solidFill>
+              </a:rPr>
+              <a:t>256KB</a:t>
+            </a:r>
+          </a:p>
+        </p:txBody>
+      </p:sp>
+      <p:sp>
+        <p:nvSpPr>
+          <p:cNvPr id="4" name="矩形 3">
+            <a:extLst>
+              <a:ext uri="{FF2B5EF4-FFF2-40B4-BE49-F238E27FC236}">
+                <a16:creationId xmlns:a16="http://schemas.microsoft.com/office/drawing/2014/main" id="{B8D7AD73-B86D-831F-4CD6-8628A340E01E}"/>
+              </a:ext>
+            </a:extLst>
+          </p:cNvPr>
+          <p:cNvSpPr/>
+          <p:nvPr/>
+        </p:nvSpPr>
+        <p:spPr>
+          <a:xfrm>
+            <a:off x="917534" y="3266240"/>
+            <a:ext cx="2019632" cy="580446"/>
+          </a:xfrm>
+          <a:prstGeom prst="rect">
+            <a:avLst/>
+          </a:prstGeom>
+          <a:solidFill>
+            <a:schemeClr val="bg2"/>
+          </a:solidFill>
+        </p:spPr>
+        <p:style>
+          <a:lnRef idx="2">
+            <a:schemeClr val="accent6">
+              <a:shade val="15000"/>
+            </a:schemeClr>
+          </a:lnRef>
+          <a:fillRef idx="1">
+            <a:schemeClr val="accent6"/>
+          </a:fillRef>
+          <a:effectRef idx="0">
+            <a:schemeClr val="accent6"/>
+          </a:effectRef>
+          <a:fontRef idx="minor">
+            <a:schemeClr val="lt1"/>
+          </a:fontRef>
+        </p:style>
+        <p:txBody>
+          <a:bodyPr rtlCol="0" anchor="ctr"/>
+          <a:lstStyle/>
+          <a:p>
+            <a:pPr algn="ctr"/>
+            <a:r>
+              <a:rPr lang="en-US" dirty="0">
+                <a:solidFill>
+                  <a:schemeClr val="tx1"/>
+                </a:solidFill>
+              </a:rPr>
+              <a:t>DRAM</a:t>
+            </a:r>
+          </a:p>
+          <a:p>
+            <a:pPr algn="ctr"/>
+            <a:r>
+              <a:rPr lang="en-US" dirty="0">
+                <a:solidFill>
+                  <a:schemeClr val="tx1"/>
+                </a:solidFill>
+              </a:rPr>
+              <a:t>inf KB</a:t>
+            </a:r>
+          </a:p>
+        </p:txBody>
+      </p:sp>
+      <p:cxnSp>
+        <p:nvCxnSpPr>
+          <p:cNvPr id="5" name="直接箭头连接符 4">
+            <a:extLst>
+              <a:ext uri="{FF2B5EF4-FFF2-40B4-BE49-F238E27FC236}">
+                <a16:creationId xmlns:a16="http://schemas.microsoft.com/office/drawing/2014/main" id="{7A81B3BA-3FE2-A571-CB20-DBE42A14B6B5}"/>
+              </a:ext>
+            </a:extLst>
+          </p:cNvPr>
+          <p:cNvCxnSpPr>
+            <a:cxnSpLocks/>
+            <a:stCxn id="3" idx="0"/>
+            <a:endCxn id="2" idx="2"/>
+          </p:cNvCxnSpPr>
+          <p:nvPr/>
+        </p:nvCxnSpPr>
+        <p:spPr>
+          <a:xfrm flipV="1">
+            <a:off x="1927350" y="1836754"/>
+            <a:ext cx="1" cy="423173"/>
+          </a:xfrm>
+          <a:prstGeom prst="straightConnector1">
+            <a:avLst/>
+          </a:prstGeom>
+          <a:ln w="57150">
+            <a:tailEnd type="triangle"/>
+          </a:ln>
+        </p:spPr>
+        <p:style>
+          <a:lnRef idx="2">
+            <a:schemeClr val="dk1"/>
+          </a:lnRef>
+          <a:fillRef idx="0">
+            <a:schemeClr val="dk1"/>
+          </a:fillRef>
+          <a:effectRef idx="1">
+            <a:schemeClr val="dk1"/>
+          </a:effectRef>
+          <a:fontRef idx="minor">
+            <a:schemeClr val="tx1"/>
+          </a:fontRef>
+        </p:style>
+      </p:cxnSp>
+      <p:cxnSp>
+        <p:nvCxnSpPr>
+          <p:cNvPr id="6" name="直接箭头连接符 5">
+            <a:extLst>
+              <a:ext uri="{FF2B5EF4-FFF2-40B4-BE49-F238E27FC236}">
+                <a16:creationId xmlns:a16="http://schemas.microsoft.com/office/drawing/2014/main" id="{5D7B7A8F-D0E3-A081-0004-6B7D4105A4B0}"/>
+              </a:ext>
+            </a:extLst>
+          </p:cNvPr>
+          <p:cNvCxnSpPr>
+            <a:cxnSpLocks/>
+            <a:stCxn id="4" idx="0"/>
+          </p:cNvCxnSpPr>
+          <p:nvPr/>
+        </p:nvCxnSpPr>
+        <p:spPr>
+          <a:xfrm flipV="1">
+            <a:off x="1927350" y="2843067"/>
+            <a:ext cx="0" cy="423173"/>
+          </a:xfrm>
+          <a:prstGeom prst="straightConnector1">
+            <a:avLst/>
+          </a:prstGeom>
+          <a:ln w="28575">
+            <a:tailEnd type="triangle"/>
+          </a:ln>
+        </p:spPr>
+        <p:style>
+          <a:lnRef idx="2">
+            <a:schemeClr val="dk1"/>
+          </a:lnRef>
+          <a:fillRef idx="0">
+            <a:schemeClr val="dk1"/>
+          </a:fillRef>
+          <a:effectRef idx="1">
+            <a:schemeClr val="dk1"/>
+          </a:effectRef>
+          <a:fontRef idx="minor">
+            <a:schemeClr val="tx1"/>
+          </a:fontRef>
+        </p:style>
+      </p:cxnSp>
+      <p:sp>
+        <p:nvSpPr>
+          <p:cNvPr id="7" name="文本框 6">
+            <a:extLst>
+              <a:ext uri="{FF2B5EF4-FFF2-40B4-BE49-F238E27FC236}">
+                <a16:creationId xmlns:a16="http://schemas.microsoft.com/office/drawing/2014/main" id="{66F467E8-64EE-56E2-F206-7AD57C55DAC2}"/>
+              </a:ext>
+            </a:extLst>
+          </p:cNvPr>
+          <p:cNvSpPr txBox="1"/>
+          <p:nvPr/>
+        </p:nvSpPr>
+        <p:spPr>
+          <a:xfrm>
+            <a:off x="1053137" y="3897833"/>
+            <a:ext cx="1772280" cy="646331"/>
+          </a:xfrm>
+          <a:prstGeom prst="rect">
+            <a:avLst/>
+          </a:prstGeom>
+          <a:noFill/>
+        </p:spPr>
+        <p:txBody>
+          <a:bodyPr wrap="none" rtlCol="0">
+            <a:spAutoFit/>
+          </a:bodyPr>
+          <a:lstStyle/>
+          <a:p>
+            <a:pPr algn="ctr"/>
+            <a:r>
+              <a:rPr lang="en-US" dirty="0"/>
+              <a:t>Per SM</a:t>
+            </a:r>
+          </a:p>
+          <a:p>
+            <a:pPr algn="ctr"/>
+            <a:r>
+              <a:rPr lang="en-US" dirty="0"/>
+              <a:t>A100 80GB SXM</a:t>
+            </a:r>
+          </a:p>
+        </p:txBody>
+      </p:sp>
+      <p:sp>
+        <p:nvSpPr>
+          <p:cNvPr id="8" name="文本框 7">
+            <a:extLst>
+              <a:ext uri="{FF2B5EF4-FFF2-40B4-BE49-F238E27FC236}">
+                <a16:creationId xmlns:a16="http://schemas.microsoft.com/office/drawing/2014/main" id="{83605DCA-FA1F-17AA-D27E-A1A03DF03DF0}"/>
+              </a:ext>
+            </a:extLst>
+          </p:cNvPr>
+          <p:cNvSpPr txBox="1"/>
+          <p:nvPr/>
+        </p:nvSpPr>
+        <p:spPr>
+          <a:xfrm>
+            <a:off x="1939277" y="1863674"/>
+            <a:ext cx="1397498" cy="369332"/>
+          </a:xfrm>
+          <a:prstGeom prst="rect">
+            <a:avLst/>
+          </a:prstGeom>
+          <a:noFill/>
+        </p:spPr>
+        <p:txBody>
+          <a:bodyPr wrap="none" rtlCol="0">
+            <a:spAutoFit/>
+          </a:bodyPr>
+          <a:lstStyle/>
+          <a:p>
+            <a:r>
+              <a:rPr lang="en-US" dirty="0"/>
+              <a:t>26.6 B/cycle</a:t>
+            </a:r>
+          </a:p>
+        </p:txBody>
+      </p:sp>
+      <p:sp>
+        <p:nvSpPr>
+          <p:cNvPr id="9" name="文本框 8">
+            <a:extLst>
+              <a:ext uri="{FF2B5EF4-FFF2-40B4-BE49-F238E27FC236}">
+                <a16:creationId xmlns:a16="http://schemas.microsoft.com/office/drawing/2014/main" id="{BD6A7140-CDB4-C69A-DD4D-CBA5C3FEE910}"/>
+              </a:ext>
+            </a:extLst>
+          </p:cNvPr>
+          <p:cNvSpPr txBox="1"/>
+          <p:nvPr/>
+        </p:nvSpPr>
+        <p:spPr>
+          <a:xfrm>
+            <a:off x="1927350" y="2867293"/>
+            <a:ext cx="1397498" cy="369332"/>
+          </a:xfrm>
+          <a:prstGeom prst="rect">
+            <a:avLst/>
+          </a:prstGeom>
+          <a:noFill/>
+        </p:spPr>
+        <p:txBody>
+          <a:bodyPr wrap="none" rtlCol="0">
+            <a:spAutoFit/>
+          </a:bodyPr>
+          <a:lstStyle/>
+          <a:p>
+            <a:r>
+              <a:rPr lang="en-US" dirty="0"/>
+              <a:t>13.3 B/cycle</a:t>
+            </a:r>
+          </a:p>
+        </p:txBody>
+      </p:sp>
+      <p:sp>
+        <p:nvSpPr>
+          <p:cNvPr id="10" name="文本框 9">
+            <a:extLst>
+              <a:ext uri="{FF2B5EF4-FFF2-40B4-BE49-F238E27FC236}">
+                <a16:creationId xmlns:a16="http://schemas.microsoft.com/office/drawing/2014/main" id="{D8B350C2-A4A2-6766-DB2B-0E6A44163F29}"/>
+              </a:ext>
+            </a:extLst>
+          </p:cNvPr>
+          <p:cNvSpPr txBox="1"/>
+          <p:nvPr/>
+        </p:nvSpPr>
+        <p:spPr>
+          <a:xfrm>
+            <a:off x="2770189" y="1361865"/>
+            <a:ext cx="1698863" cy="369332"/>
+          </a:xfrm>
+          <a:prstGeom prst="rect">
+            <a:avLst/>
+          </a:prstGeom>
+          <a:noFill/>
+        </p:spPr>
+        <p:txBody>
+          <a:bodyPr wrap="none" rtlCol="0">
+            <a:spAutoFit/>
+          </a:bodyPr>
+          <a:lstStyle/>
+          <a:p>
+            <a:r>
+              <a:rPr lang="en-US" dirty="0"/>
+              <a:t>3.33 FMA/cycle</a:t>
+            </a:r>
+          </a:p>
+        </p:txBody>
+      </p:sp>
+      <p:sp>
+        <p:nvSpPr>
+          <p:cNvPr id="21" name="文本框 20">
+            <a:extLst>
+              <a:ext uri="{FF2B5EF4-FFF2-40B4-BE49-F238E27FC236}">
+                <a16:creationId xmlns:a16="http://schemas.microsoft.com/office/drawing/2014/main" id="{D6FF06E0-50CA-DAF5-4B19-3644B7B0C6CB}"/>
+              </a:ext>
+            </a:extLst>
+          </p:cNvPr>
+          <p:cNvSpPr txBox="1"/>
+          <p:nvPr/>
+        </p:nvSpPr>
+        <p:spPr>
+          <a:xfrm>
+            <a:off x="3473654" y="2894213"/>
+            <a:ext cx="1235466" cy="369332"/>
+          </a:xfrm>
+          <a:prstGeom prst="rect">
+            <a:avLst/>
+          </a:prstGeom>
+          <a:noFill/>
+        </p:spPr>
+        <p:txBody>
+          <a:bodyPr wrap="none" rtlCol="0">
+            <a:spAutoFit/>
+          </a:bodyPr>
+          <a:lstStyle/>
+          <a:p>
+            <a:r>
+              <a:rPr lang="en-US" dirty="0"/>
+              <a:t>Equivalent</a:t>
+            </a:r>
+          </a:p>
+        </p:txBody>
+      </p:sp>
+      <p:cxnSp>
+        <p:nvCxnSpPr>
+          <p:cNvPr id="22" name="直接箭头连接符 21">
+            <a:extLst>
+              <a:ext uri="{FF2B5EF4-FFF2-40B4-BE49-F238E27FC236}">
+                <a16:creationId xmlns:a16="http://schemas.microsoft.com/office/drawing/2014/main" id="{E53B6694-6FD0-E7AD-21A7-EB0EAC1EFCC4}"/>
+              </a:ext>
+            </a:extLst>
+          </p:cNvPr>
+          <p:cNvCxnSpPr>
+            <a:cxnSpLocks/>
+          </p:cNvCxnSpPr>
+          <p:nvPr/>
+        </p:nvCxnSpPr>
+        <p:spPr>
+          <a:xfrm>
+            <a:off x="3301123" y="3351010"/>
+            <a:ext cx="1580528" cy="0"/>
+          </a:xfrm>
+          <a:prstGeom prst="straightConnector1">
+            <a:avLst/>
+          </a:prstGeom>
+          <a:ln w="38100">
+            <a:headEnd type="triangle" w="med" len="med"/>
+            <a:tailEnd type="triangle" w="med" len="med"/>
+          </a:ln>
+        </p:spPr>
+        <p:style>
+          <a:lnRef idx="2">
+            <a:schemeClr val="dk1"/>
+          </a:lnRef>
+          <a:fillRef idx="0">
+            <a:schemeClr val="dk1"/>
+          </a:fillRef>
+          <a:effectRef idx="1">
+            <a:schemeClr val="dk1"/>
+          </a:effectRef>
+          <a:fontRef idx="minor">
+            <a:schemeClr val="tx1"/>
+          </a:fontRef>
+        </p:style>
+      </p:cxnSp>
+      <p:sp>
+        <p:nvSpPr>
+          <p:cNvPr id="24" name="文本框 23">
+            <a:extLst>
+              <a:ext uri="{FF2B5EF4-FFF2-40B4-BE49-F238E27FC236}">
+                <a16:creationId xmlns:a16="http://schemas.microsoft.com/office/drawing/2014/main" id="{152483BD-FFF4-C7AC-FAEE-EDC03ADB2087}"/>
+              </a:ext>
+            </a:extLst>
+          </p:cNvPr>
+          <p:cNvSpPr txBox="1"/>
+          <p:nvPr/>
+        </p:nvSpPr>
+        <p:spPr>
+          <a:xfrm>
+            <a:off x="1218823" y="2862967"/>
+            <a:ext cx="720454" cy="369332"/>
+          </a:xfrm>
+          <a:prstGeom prst="rect">
+            <a:avLst/>
+          </a:prstGeom>
+          <a:noFill/>
+        </p:spPr>
+        <p:txBody>
+          <a:bodyPr wrap="none" rtlCol="0">
+            <a:spAutoFit/>
+          </a:bodyPr>
+          <a:lstStyle/>
+          <a:p>
+            <a:r>
+              <a:rPr lang="en-US" dirty="0">
+                <a:solidFill>
+                  <a:srgbClr val="FF0000"/>
+                </a:solidFill>
+              </a:rPr>
+              <a:t>+LRC</a:t>
+            </a:r>
+          </a:p>
+        </p:txBody>
+      </p:sp>
+      <p:sp>
+        <p:nvSpPr>
+          <p:cNvPr id="25" name="矩形 24">
+            <a:extLst>
+              <a:ext uri="{FF2B5EF4-FFF2-40B4-BE49-F238E27FC236}">
+                <a16:creationId xmlns:a16="http://schemas.microsoft.com/office/drawing/2014/main" id="{FC47527B-1B30-583B-4B6E-6B64F7C5FDFE}"/>
+              </a:ext>
+            </a:extLst>
+          </p:cNvPr>
+          <p:cNvSpPr/>
+          <p:nvPr/>
+        </p:nvSpPr>
+        <p:spPr>
+          <a:xfrm>
+            <a:off x="5360975" y="1256308"/>
+            <a:ext cx="1502797" cy="580446"/>
+          </a:xfrm>
+          <a:prstGeom prst="rect">
+            <a:avLst/>
+          </a:prstGeom>
+        </p:spPr>
+        <p:style>
+          <a:lnRef idx="2">
+            <a:schemeClr val="accent6">
+              <a:shade val="15000"/>
+            </a:schemeClr>
+          </a:lnRef>
+          <a:fillRef idx="1">
+            <a:schemeClr val="accent6"/>
+          </a:fillRef>
+          <a:effectRef idx="0">
+            <a:schemeClr val="accent6"/>
+          </a:effectRef>
+          <a:fontRef idx="minor">
+            <a:schemeClr val="lt1"/>
+          </a:fontRef>
+        </p:style>
+        <p:txBody>
+          <a:bodyPr rtlCol="0" anchor="ctr"/>
+          <a:lstStyle/>
+          <a:p>
+            <a:pPr algn="ctr"/>
+            <a:r>
+              <a:rPr lang="en-US" dirty="0"/>
+              <a:t>SM CUDA Core</a:t>
+            </a:r>
+          </a:p>
+        </p:txBody>
+      </p:sp>
+      <p:sp>
+        <p:nvSpPr>
+          <p:cNvPr id="26" name="矩形 25">
+            <a:extLst>
+              <a:ext uri="{FF2B5EF4-FFF2-40B4-BE49-F238E27FC236}">
+                <a16:creationId xmlns:a16="http://schemas.microsoft.com/office/drawing/2014/main" id="{D2D90E76-8BDA-6AF3-B291-8A2FB10E7766}"/>
+              </a:ext>
+            </a:extLst>
+          </p:cNvPr>
+          <p:cNvSpPr/>
+          <p:nvPr/>
+        </p:nvSpPr>
+        <p:spPr>
+          <a:xfrm>
+            <a:off x="5102557" y="2259927"/>
+            <a:ext cx="2019632" cy="580445"/>
+          </a:xfrm>
+          <a:prstGeom prst="rect">
+            <a:avLst/>
+          </a:prstGeom>
+          <a:solidFill>
+            <a:schemeClr val="bg2"/>
+          </a:solidFill>
+        </p:spPr>
+        <p:style>
+          <a:lnRef idx="2">
+            <a:schemeClr val="accent6">
+              <a:shade val="15000"/>
+            </a:schemeClr>
+          </a:lnRef>
+          <a:fillRef idx="1">
+            <a:schemeClr val="accent6"/>
+          </a:fillRef>
+          <a:effectRef idx="0">
+            <a:schemeClr val="accent6"/>
+          </a:effectRef>
+          <a:fontRef idx="minor">
+            <a:schemeClr val="lt1"/>
+          </a:fontRef>
+        </p:style>
+        <p:txBody>
+          <a:bodyPr rtlCol="0" anchor="ctr"/>
+          <a:lstStyle/>
+          <a:p>
+            <a:pPr algn="ctr"/>
+            <a:r>
+              <a:rPr lang="en-US" dirty="0">
+                <a:solidFill>
+                  <a:schemeClr val="tx1"/>
+                </a:solidFill>
+              </a:rPr>
+              <a:t>RF</a:t>
+            </a:r>
+          </a:p>
+          <a:p>
+            <a:pPr algn="ctr"/>
+            <a:r>
+              <a:rPr lang="en-US" dirty="0">
+                <a:solidFill>
+                  <a:schemeClr val="tx1"/>
+                </a:solidFill>
+              </a:rPr>
+              <a:t>256KB</a:t>
+            </a:r>
+          </a:p>
+        </p:txBody>
+      </p:sp>
+      <p:sp>
+        <p:nvSpPr>
+          <p:cNvPr id="27" name="矩形 26">
+            <a:extLst>
+              <a:ext uri="{FF2B5EF4-FFF2-40B4-BE49-F238E27FC236}">
+                <a16:creationId xmlns:a16="http://schemas.microsoft.com/office/drawing/2014/main" id="{D5C5ACCA-7350-22C3-237A-A92D7BDF8783}"/>
+              </a:ext>
+            </a:extLst>
+          </p:cNvPr>
+          <p:cNvSpPr/>
+          <p:nvPr/>
+        </p:nvSpPr>
+        <p:spPr>
+          <a:xfrm>
+            <a:off x="5102557" y="3266240"/>
+            <a:ext cx="2019632" cy="580446"/>
+          </a:xfrm>
+          <a:prstGeom prst="rect">
+            <a:avLst/>
+          </a:prstGeom>
+          <a:solidFill>
+            <a:schemeClr val="bg2"/>
+          </a:solidFill>
+        </p:spPr>
+        <p:style>
+          <a:lnRef idx="2">
+            <a:schemeClr val="accent6">
+              <a:shade val="15000"/>
+            </a:schemeClr>
+          </a:lnRef>
+          <a:fillRef idx="1">
+            <a:schemeClr val="accent6"/>
+          </a:fillRef>
+          <a:effectRef idx="0">
+            <a:schemeClr val="accent6"/>
+          </a:effectRef>
+          <a:fontRef idx="minor">
+            <a:schemeClr val="lt1"/>
+          </a:fontRef>
+        </p:style>
+        <p:txBody>
+          <a:bodyPr rtlCol="0" anchor="ctr"/>
+          <a:lstStyle/>
+          <a:p>
+            <a:pPr algn="ctr"/>
+            <a:r>
+              <a:rPr lang="en-US" dirty="0">
+                <a:solidFill>
+                  <a:schemeClr val="tx1"/>
+                </a:solidFill>
+              </a:rPr>
+              <a:t>DRAM</a:t>
+            </a:r>
+          </a:p>
+          <a:p>
+            <a:pPr algn="ctr"/>
+            <a:r>
+              <a:rPr lang="en-US" dirty="0">
+                <a:solidFill>
+                  <a:schemeClr val="tx1"/>
+                </a:solidFill>
+              </a:rPr>
+              <a:t>inf KB</a:t>
+            </a:r>
+          </a:p>
+        </p:txBody>
+      </p:sp>
+      <p:cxnSp>
+        <p:nvCxnSpPr>
+          <p:cNvPr id="28" name="直接箭头连接符 27">
+            <a:extLst>
+              <a:ext uri="{FF2B5EF4-FFF2-40B4-BE49-F238E27FC236}">
+                <a16:creationId xmlns:a16="http://schemas.microsoft.com/office/drawing/2014/main" id="{B07BAD2D-D9B7-4D89-5078-91AD86F59384}"/>
+              </a:ext>
+            </a:extLst>
+          </p:cNvPr>
+          <p:cNvCxnSpPr>
+            <a:cxnSpLocks/>
+            <a:stCxn id="26" idx="0"/>
+            <a:endCxn id="25" idx="2"/>
+          </p:cNvCxnSpPr>
+          <p:nvPr/>
+        </p:nvCxnSpPr>
+        <p:spPr>
+          <a:xfrm flipV="1">
+            <a:off x="6112373" y="1836754"/>
+            <a:ext cx="1" cy="423173"/>
+          </a:xfrm>
+          <a:prstGeom prst="straightConnector1">
+            <a:avLst/>
+          </a:prstGeom>
+          <a:ln w="57150">
+            <a:tailEnd type="triangle"/>
+          </a:ln>
+        </p:spPr>
+        <p:style>
+          <a:lnRef idx="2">
+            <a:schemeClr val="dk1"/>
+          </a:lnRef>
+          <a:fillRef idx="0">
+            <a:schemeClr val="dk1"/>
+          </a:fillRef>
+          <a:effectRef idx="1">
+            <a:schemeClr val="dk1"/>
+          </a:effectRef>
+          <a:fontRef idx="minor">
+            <a:schemeClr val="tx1"/>
+          </a:fontRef>
+        </p:style>
+      </p:cxnSp>
+      <p:cxnSp>
+        <p:nvCxnSpPr>
+          <p:cNvPr id="29" name="直接箭头连接符 28">
+            <a:extLst>
+              <a:ext uri="{FF2B5EF4-FFF2-40B4-BE49-F238E27FC236}">
+                <a16:creationId xmlns:a16="http://schemas.microsoft.com/office/drawing/2014/main" id="{B122CEFA-6AEA-F91E-C906-772E407CFE3B}"/>
+              </a:ext>
+            </a:extLst>
+          </p:cNvPr>
+          <p:cNvCxnSpPr>
+            <a:cxnSpLocks/>
+            <a:stCxn id="27" idx="0"/>
+          </p:cNvCxnSpPr>
+          <p:nvPr/>
+        </p:nvCxnSpPr>
+        <p:spPr>
+          <a:xfrm flipV="1">
+            <a:off x="6112373" y="2843067"/>
+            <a:ext cx="0" cy="423173"/>
+          </a:xfrm>
+          <a:prstGeom prst="straightConnector1">
+            <a:avLst/>
+          </a:prstGeom>
+          <a:ln w="28575">
+            <a:tailEnd type="triangle"/>
+          </a:ln>
+        </p:spPr>
+        <p:style>
+          <a:lnRef idx="2">
+            <a:schemeClr val="dk1"/>
+          </a:lnRef>
+          <a:fillRef idx="0">
+            <a:schemeClr val="dk1"/>
+          </a:fillRef>
+          <a:effectRef idx="1">
+            <a:schemeClr val="dk1"/>
+          </a:effectRef>
+          <a:fontRef idx="minor">
+            <a:schemeClr val="tx1"/>
+          </a:fontRef>
+        </p:style>
+      </p:cxnSp>
+      <p:sp>
+        <p:nvSpPr>
+          <p:cNvPr id="30" name="文本框 29">
+            <a:extLst>
+              <a:ext uri="{FF2B5EF4-FFF2-40B4-BE49-F238E27FC236}">
+                <a16:creationId xmlns:a16="http://schemas.microsoft.com/office/drawing/2014/main" id="{8BCFB22E-79BE-57F5-2F86-6CEB0CC32A9D}"/>
+              </a:ext>
+            </a:extLst>
+          </p:cNvPr>
+          <p:cNvSpPr txBox="1"/>
+          <p:nvPr/>
+        </p:nvSpPr>
+        <p:spPr>
+          <a:xfrm>
+            <a:off x="5238160" y="3897833"/>
+            <a:ext cx="1772280" cy="646331"/>
+          </a:xfrm>
+          <a:prstGeom prst="rect">
+            <a:avLst/>
+          </a:prstGeom>
+          <a:noFill/>
+        </p:spPr>
+        <p:txBody>
+          <a:bodyPr wrap="none" rtlCol="0">
+            <a:spAutoFit/>
+          </a:bodyPr>
+          <a:lstStyle/>
+          <a:p>
+            <a:pPr algn="ctr"/>
+            <a:r>
+              <a:rPr lang="en-US" dirty="0"/>
+              <a:t>Per SM</a:t>
+            </a:r>
+          </a:p>
+          <a:p>
+            <a:pPr algn="ctr"/>
+            <a:r>
+              <a:rPr lang="en-US" dirty="0"/>
+              <a:t>A100 80GB SXM</a:t>
+            </a:r>
+          </a:p>
+        </p:txBody>
+      </p:sp>
+      <p:sp>
+        <p:nvSpPr>
+          <p:cNvPr id="31" name="文本框 30">
+            <a:extLst>
+              <a:ext uri="{FF2B5EF4-FFF2-40B4-BE49-F238E27FC236}">
+                <a16:creationId xmlns:a16="http://schemas.microsoft.com/office/drawing/2014/main" id="{B19D10F7-EEF7-CA38-ED25-3081F7078408}"/>
+              </a:ext>
+            </a:extLst>
+          </p:cNvPr>
+          <p:cNvSpPr txBox="1"/>
+          <p:nvPr/>
+        </p:nvSpPr>
+        <p:spPr>
+          <a:xfrm>
+            <a:off x="6124300" y="1863674"/>
+            <a:ext cx="1397498" cy="369332"/>
+          </a:xfrm>
+          <a:prstGeom prst="rect">
+            <a:avLst/>
+          </a:prstGeom>
+          <a:noFill/>
+        </p:spPr>
+        <p:txBody>
+          <a:bodyPr wrap="none" rtlCol="0">
+            <a:spAutoFit/>
+          </a:bodyPr>
+          <a:lstStyle/>
+          <a:p>
+            <a:r>
+              <a:rPr lang="en-US" dirty="0"/>
+              <a:t>26.6 B/cycle</a:t>
+            </a:r>
+          </a:p>
+        </p:txBody>
+      </p:sp>
+      <p:sp>
+        <p:nvSpPr>
+          <p:cNvPr id="32" name="文本框 31">
+            <a:extLst>
+              <a:ext uri="{FF2B5EF4-FFF2-40B4-BE49-F238E27FC236}">
+                <a16:creationId xmlns:a16="http://schemas.microsoft.com/office/drawing/2014/main" id="{2BA2E1B9-2D01-600C-9618-A4189517570E}"/>
+              </a:ext>
+            </a:extLst>
+          </p:cNvPr>
+          <p:cNvSpPr txBox="1"/>
+          <p:nvPr/>
+        </p:nvSpPr>
+        <p:spPr>
+          <a:xfrm>
+            <a:off x="6112373" y="2867293"/>
+            <a:ext cx="1397498" cy="369332"/>
+          </a:xfrm>
+          <a:prstGeom prst="rect">
+            <a:avLst/>
+          </a:prstGeom>
+          <a:noFill/>
+        </p:spPr>
+        <p:txBody>
+          <a:bodyPr wrap="none" rtlCol="0">
+            <a:spAutoFit/>
+          </a:bodyPr>
+          <a:lstStyle/>
+          <a:p>
+            <a:r>
+              <a:rPr lang="en-US" dirty="0"/>
+              <a:t>26.6 B/cycle</a:t>
+            </a:r>
+          </a:p>
+        </p:txBody>
+      </p:sp>
+      <p:sp>
+        <p:nvSpPr>
+          <p:cNvPr id="33" name="文本框 32">
+            <a:extLst>
+              <a:ext uri="{FF2B5EF4-FFF2-40B4-BE49-F238E27FC236}">
+                <a16:creationId xmlns:a16="http://schemas.microsoft.com/office/drawing/2014/main" id="{CAAA7B8F-E62D-AF1B-299D-6039CAFEAD9D}"/>
+              </a:ext>
+            </a:extLst>
+          </p:cNvPr>
+          <p:cNvSpPr txBox="1"/>
+          <p:nvPr/>
+        </p:nvSpPr>
+        <p:spPr>
+          <a:xfrm>
+            <a:off x="6955212" y="1361865"/>
+            <a:ext cx="1698863" cy="369332"/>
+          </a:xfrm>
+          <a:prstGeom prst="rect">
+            <a:avLst/>
+          </a:prstGeom>
+          <a:noFill/>
+        </p:spPr>
+        <p:txBody>
+          <a:bodyPr wrap="none" rtlCol="0">
+            <a:spAutoFit/>
+          </a:bodyPr>
+          <a:lstStyle/>
+          <a:p>
+            <a:r>
+              <a:rPr lang="en-US" dirty="0"/>
+              <a:t>3.33 FMA/cycle</a:t>
+            </a:r>
+          </a:p>
+        </p:txBody>
+      </p:sp>
+      <p:sp>
+        <p:nvSpPr>
+          <p:cNvPr id="37" name="文本框 36">
+            <a:extLst>
+              <a:ext uri="{FF2B5EF4-FFF2-40B4-BE49-F238E27FC236}">
+                <a16:creationId xmlns:a16="http://schemas.microsoft.com/office/drawing/2014/main" id="{1A0DBD8A-FBFB-D81B-5497-12EF4CF4FD1D}"/>
+              </a:ext>
+            </a:extLst>
+          </p:cNvPr>
+          <p:cNvSpPr txBox="1"/>
+          <p:nvPr/>
+        </p:nvSpPr>
+        <p:spPr>
+          <a:xfrm>
+            <a:off x="5190645" y="2882101"/>
+            <a:ext cx="933654" cy="369332"/>
+          </a:xfrm>
+          <a:prstGeom prst="rect">
+            <a:avLst/>
+          </a:prstGeom>
+          <a:noFill/>
+        </p:spPr>
+        <p:txBody>
+          <a:bodyPr wrap="none" rtlCol="0">
+            <a:spAutoFit/>
+          </a:bodyPr>
+          <a:lstStyle/>
+          <a:p>
+            <a:r>
+              <a:rPr lang="en-US" dirty="0">
+                <a:solidFill>
+                  <a:srgbClr val="FF0000"/>
+                </a:solidFill>
+              </a:rPr>
+              <a:t>No LRC</a:t>
+            </a:r>
+          </a:p>
+        </p:txBody>
+      </p:sp>
+    </p:spTree>
+    <p:extLst>
+      <p:ext uri="{BB962C8B-B14F-4D97-AF65-F5344CB8AC3E}">
+        <p14:creationId xmlns:p14="http://schemas.microsoft.com/office/powerpoint/2010/main" val="4243222066"/>
+      </p:ext>
+    </p:extLst>
+  </p:cSld>
+  <p:clrMapOvr>
+    <a:masterClrMapping/>
+  </p:clrMapOvr>
+</p:sld>
+</file>
+
 <file path=ppt/slides/slide2.xml><?xml version="1.0" encoding="utf-8"?>
 <p:sld xmlns:a="http://schemas.openxmlformats.org/drawingml/2006/main" xmlns:r="http://schemas.openxmlformats.org/officeDocument/2006/relationships" xmlns:p="http://schemas.openxmlformats.org/presentationml/2006/main">
   <p:cSld>

</xml_diff>